<commit_message>
updating final figures by making eps and pdf and changing color scheme a bit
</commit_message>
<xml_diff>
--- a/figures/Figure1/theoretical_1.pptx
+++ b/figures/Figure1/theoretical_1.pptx
@@ -202,7 +202,7 @@
           <a:p>
             <a:fld id="{057BAB6D-7E1E-0B46-9758-CA2E2B8212E4}" type="datetimeFigureOut">
               <a:rPr lang="en-US" smtClean="0"/>
-              <a:t>5/26/21</a:t>
+              <a:t>9/7/21</a:t>
             </a:fld>
             <a:endParaRPr lang="en-US"/>
           </a:p>
@@ -1518,7 +1518,7 @@
           <a:p>
             <a:fld id="{8BE117EF-08D2-C047-8D6D-3F46F7F823A4}" type="datetimeFigureOut">
               <a:rPr lang="en-US" smtClean="0"/>
-              <a:t>5/26/21</a:t>
+              <a:t>9/7/21</a:t>
             </a:fld>
             <a:endParaRPr lang="en-US"/>
           </a:p>
@@ -1688,7 +1688,7 @@
           <a:p>
             <a:fld id="{8BE117EF-08D2-C047-8D6D-3F46F7F823A4}" type="datetimeFigureOut">
               <a:rPr lang="en-US" smtClean="0"/>
-              <a:t>5/26/21</a:t>
+              <a:t>9/7/21</a:t>
             </a:fld>
             <a:endParaRPr lang="en-US"/>
           </a:p>
@@ -1868,7 +1868,7 @@
           <a:p>
             <a:fld id="{8BE117EF-08D2-C047-8D6D-3F46F7F823A4}" type="datetimeFigureOut">
               <a:rPr lang="en-US" smtClean="0"/>
-              <a:t>5/26/21</a:t>
+              <a:t>9/7/21</a:t>
             </a:fld>
             <a:endParaRPr lang="en-US"/>
           </a:p>
@@ -2038,7 +2038,7 @@
           <a:p>
             <a:fld id="{8BE117EF-08D2-C047-8D6D-3F46F7F823A4}" type="datetimeFigureOut">
               <a:rPr lang="en-US" smtClean="0"/>
-              <a:t>5/26/21</a:t>
+              <a:t>9/7/21</a:t>
             </a:fld>
             <a:endParaRPr lang="en-US"/>
           </a:p>
@@ -2282,7 +2282,7 @@
           <a:p>
             <a:fld id="{8BE117EF-08D2-C047-8D6D-3F46F7F823A4}" type="datetimeFigureOut">
               <a:rPr lang="en-US" smtClean="0"/>
-              <a:t>5/26/21</a:t>
+              <a:t>9/7/21</a:t>
             </a:fld>
             <a:endParaRPr lang="en-US"/>
           </a:p>
@@ -2514,7 +2514,7 @@
           <a:p>
             <a:fld id="{8BE117EF-08D2-C047-8D6D-3F46F7F823A4}" type="datetimeFigureOut">
               <a:rPr lang="en-US" smtClean="0"/>
-              <a:t>5/26/21</a:t>
+              <a:t>9/7/21</a:t>
             </a:fld>
             <a:endParaRPr lang="en-US"/>
           </a:p>
@@ -2881,7 +2881,7 @@
           <a:p>
             <a:fld id="{8BE117EF-08D2-C047-8D6D-3F46F7F823A4}" type="datetimeFigureOut">
               <a:rPr lang="en-US" smtClean="0"/>
-              <a:t>5/26/21</a:t>
+              <a:t>9/7/21</a:t>
             </a:fld>
             <a:endParaRPr lang="en-US"/>
           </a:p>
@@ -2999,7 +2999,7 @@
           <a:p>
             <a:fld id="{8BE117EF-08D2-C047-8D6D-3F46F7F823A4}" type="datetimeFigureOut">
               <a:rPr lang="en-US" smtClean="0"/>
-              <a:t>5/26/21</a:t>
+              <a:t>9/7/21</a:t>
             </a:fld>
             <a:endParaRPr lang="en-US"/>
           </a:p>
@@ -3094,7 +3094,7 @@
           <a:p>
             <a:fld id="{8BE117EF-08D2-C047-8D6D-3F46F7F823A4}" type="datetimeFigureOut">
               <a:rPr lang="en-US" smtClean="0"/>
-              <a:t>5/26/21</a:t>
+              <a:t>9/7/21</a:t>
             </a:fld>
             <a:endParaRPr lang="en-US"/>
           </a:p>
@@ -3371,7 +3371,7 @@
           <a:p>
             <a:fld id="{8BE117EF-08D2-C047-8D6D-3F46F7F823A4}" type="datetimeFigureOut">
               <a:rPr lang="en-US" smtClean="0"/>
-              <a:t>5/26/21</a:t>
+              <a:t>9/7/21</a:t>
             </a:fld>
             <a:endParaRPr lang="en-US"/>
           </a:p>
@@ -3628,7 +3628,7 @@
           <a:p>
             <a:fld id="{8BE117EF-08D2-C047-8D6D-3F46F7F823A4}" type="datetimeFigureOut">
               <a:rPr lang="en-US" smtClean="0"/>
-              <a:t>5/26/21</a:t>
+              <a:t>9/7/21</a:t>
             </a:fld>
             <a:endParaRPr lang="en-US"/>
           </a:p>
@@ -3841,7 +3841,7 @@
           <a:p>
             <a:fld id="{8BE117EF-08D2-C047-8D6D-3F46F7F823A4}" type="datetimeFigureOut">
               <a:rPr lang="en-US" smtClean="0"/>
-              <a:t>5/26/21</a:t>
+              <a:t>9/7/21</a:t>
             </a:fld>
             <a:endParaRPr lang="en-US"/>
           </a:p>
@@ -40997,8 +40997,8 @@
         </p:nvSpPr>
         <p:spPr>
           <a:xfrm rot="16200000">
-            <a:off x="3587145" y="3524295"/>
-            <a:ext cx="978694" cy="187615"/>
+            <a:off x="3450159" y="3582900"/>
+            <a:ext cx="1270084" cy="187615"/>
           </a:xfrm>
           <a:prstGeom prst="rect">
             <a:avLst/>
@@ -41011,920 +41011,16 @@
           </a:bodyPr>
           <a:lstStyle/>
           <a:p>
+            <a:pPr algn="ctr"/>
             <a:r>
               <a:rPr lang="en-US" sz="619" dirty="0">
                 <a:latin typeface="Helvetica" pitchFamily="2" charset="0"/>
               </a:rPr>
-              <a:t>Temperature</a:t>
+              <a:t>Count</a:t>
             </a:r>
           </a:p>
         </p:txBody>
       </p:sp>
-      <p:sp>
-        <p:nvSpPr>
-          <p:cNvPr id="385" name="TextBox 384">
-            <a:extLst>
-              <a:ext uri="{FF2B5EF4-FFF2-40B4-BE49-F238E27FC236}">
-                <a16:creationId xmlns:a16="http://schemas.microsoft.com/office/drawing/2014/main" id="{B704D98D-FD25-754C-8B3A-8ECEE3780DB1}"/>
-              </a:ext>
-            </a:extLst>
-          </p:cNvPr>
-          <p:cNvSpPr txBox="1"/>
-          <p:nvPr/>
-        </p:nvSpPr>
-        <p:spPr>
-          <a:xfrm>
-            <a:off x="5065647" y="4268660"/>
-            <a:ext cx="222225" cy="187615"/>
-          </a:xfrm>
-          <a:prstGeom prst="rect">
-            <a:avLst/>
-          </a:prstGeom>
-          <a:noFill/>
-        </p:spPr>
-        <p:txBody>
-          <a:bodyPr wrap="square" rtlCol="0">
-            <a:spAutoFit/>
-          </a:bodyPr>
-          <a:lstStyle/>
-          <a:p>
-            <a:r>
-              <a:rPr lang="en-US" sz="619" dirty="0">
-                <a:latin typeface="Helvetica" pitchFamily="2" charset="0"/>
-              </a:rPr>
-              <a:t>1</a:t>
-            </a:r>
-          </a:p>
-        </p:txBody>
-      </p:sp>
-      <p:grpSp>
-        <p:nvGrpSpPr>
-          <p:cNvPr id="407" name="Group 406">
-            <a:extLst>
-              <a:ext uri="{FF2B5EF4-FFF2-40B4-BE49-F238E27FC236}">
-                <a16:creationId xmlns:a16="http://schemas.microsoft.com/office/drawing/2014/main" id="{A24993DA-E381-CC49-AFC6-E7B8A8AFD464}"/>
-              </a:ext>
-            </a:extLst>
-          </p:cNvPr>
-          <p:cNvGrpSpPr/>
-          <p:nvPr/>
-        </p:nvGrpSpPr>
-        <p:grpSpPr>
-          <a:xfrm>
-            <a:off x="4205896" y="3442348"/>
-            <a:ext cx="1942350" cy="779469"/>
-            <a:chOff x="4273905" y="3487376"/>
-            <a:chExt cx="1075073" cy="431429"/>
-          </a:xfrm>
-        </p:grpSpPr>
-        <p:sp>
-          <p:nvSpPr>
-            <p:cNvPr id="373" name="Freeform 372">
-              <a:extLst>
-                <a:ext uri="{FF2B5EF4-FFF2-40B4-BE49-F238E27FC236}">
-                  <a16:creationId xmlns:a16="http://schemas.microsoft.com/office/drawing/2014/main" id="{CF4651C6-173D-4B48-8706-FC17AA57D295}"/>
-                </a:ext>
-              </a:extLst>
-            </p:cNvPr>
-            <p:cNvSpPr/>
-            <p:nvPr/>
-          </p:nvSpPr>
-          <p:spPr>
-            <a:xfrm>
-              <a:off x="4273905" y="3613315"/>
-              <a:ext cx="537970" cy="255190"/>
-            </a:xfrm>
-            <a:custGeom>
-              <a:avLst/>
-              <a:gdLst>
-                <a:gd name="connsiteX0" fmla="*/ 0 w 1875692"/>
-                <a:gd name="connsiteY0" fmla="*/ 937383 h 1072198"/>
-                <a:gd name="connsiteX1" fmla="*/ 181708 w 1875692"/>
-                <a:gd name="connsiteY1" fmla="*/ 1001860 h 1072198"/>
-                <a:gd name="connsiteX2" fmla="*/ 410308 w 1875692"/>
-                <a:gd name="connsiteY2" fmla="*/ 913937 h 1072198"/>
-                <a:gd name="connsiteX3" fmla="*/ 586154 w 1875692"/>
-                <a:gd name="connsiteY3" fmla="*/ 972552 h 1072198"/>
-                <a:gd name="connsiteX4" fmla="*/ 756139 w 1875692"/>
-                <a:gd name="connsiteY4" fmla="*/ 790844 h 1072198"/>
-                <a:gd name="connsiteX5" fmla="*/ 1084385 w 1875692"/>
-                <a:gd name="connsiteY5" fmla="*/ 5398 h 1072198"/>
-                <a:gd name="connsiteX6" fmla="*/ 1459523 w 1875692"/>
-                <a:gd name="connsiteY6" fmla="*/ 456737 h 1072198"/>
-                <a:gd name="connsiteX7" fmla="*/ 1693985 w 1875692"/>
-                <a:gd name="connsiteY7" fmla="*/ 702921 h 1072198"/>
-                <a:gd name="connsiteX8" fmla="*/ 1875692 w 1875692"/>
-                <a:gd name="connsiteY8" fmla="*/ 1072198 h 1072198"/>
-              </a:gdLst>
-              <a:ahLst/>
-              <a:cxnLst>
-                <a:cxn ang="0">
-                  <a:pos x="connsiteX0" y="connsiteY0"/>
-                </a:cxn>
-                <a:cxn ang="0">
-                  <a:pos x="connsiteX1" y="connsiteY1"/>
-                </a:cxn>
-                <a:cxn ang="0">
-                  <a:pos x="connsiteX2" y="connsiteY2"/>
-                </a:cxn>
-                <a:cxn ang="0">
-                  <a:pos x="connsiteX3" y="connsiteY3"/>
-                </a:cxn>
-                <a:cxn ang="0">
-                  <a:pos x="connsiteX4" y="connsiteY4"/>
-                </a:cxn>
-                <a:cxn ang="0">
-                  <a:pos x="connsiteX5" y="connsiteY5"/>
-                </a:cxn>
-                <a:cxn ang="0">
-                  <a:pos x="connsiteX6" y="connsiteY6"/>
-                </a:cxn>
-                <a:cxn ang="0">
-                  <a:pos x="connsiteX7" y="connsiteY7"/>
-                </a:cxn>
-                <a:cxn ang="0">
-                  <a:pos x="connsiteX8" y="connsiteY8"/>
-                </a:cxn>
-              </a:cxnLst>
-              <a:rect l="l" t="t" r="r" b="b"/>
-              <a:pathLst>
-                <a:path w="1875692" h="1072198">
-                  <a:moveTo>
-                    <a:pt x="0" y="937383"/>
-                  </a:moveTo>
-                  <a:cubicBezTo>
-                    <a:pt x="56661" y="971575"/>
-                    <a:pt x="113323" y="1005768"/>
-                    <a:pt x="181708" y="1001860"/>
-                  </a:cubicBezTo>
-                  <a:cubicBezTo>
-                    <a:pt x="250093" y="997952"/>
-                    <a:pt x="342900" y="918822"/>
-                    <a:pt x="410308" y="913937"/>
-                  </a:cubicBezTo>
-                  <a:cubicBezTo>
-                    <a:pt x="477716" y="909052"/>
-                    <a:pt x="528516" y="993067"/>
-                    <a:pt x="586154" y="972552"/>
-                  </a:cubicBezTo>
-                  <a:cubicBezTo>
-                    <a:pt x="643792" y="952037"/>
-                    <a:pt x="673101" y="952036"/>
-                    <a:pt x="756139" y="790844"/>
-                  </a:cubicBezTo>
-                  <a:cubicBezTo>
-                    <a:pt x="839178" y="629652"/>
-                    <a:pt x="967154" y="61082"/>
-                    <a:pt x="1084385" y="5398"/>
-                  </a:cubicBezTo>
-                  <a:cubicBezTo>
-                    <a:pt x="1201616" y="-50287"/>
-                    <a:pt x="1357923" y="340483"/>
-                    <a:pt x="1459523" y="456737"/>
-                  </a:cubicBezTo>
-                  <a:cubicBezTo>
-                    <a:pt x="1561123" y="572991"/>
-                    <a:pt x="1624624" y="600344"/>
-                    <a:pt x="1693985" y="702921"/>
-                  </a:cubicBezTo>
-                  <a:cubicBezTo>
-                    <a:pt x="1763346" y="805498"/>
-                    <a:pt x="1819519" y="938848"/>
-                    <a:pt x="1875692" y="1072198"/>
-                  </a:cubicBezTo>
-                </a:path>
-              </a:pathLst>
-            </a:custGeom>
-            <a:noFill/>
-            <a:ln>
-              <a:solidFill>
-                <a:schemeClr val="tx1">
-                  <a:lumMod val="65000"/>
-                  <a:lumOff val="35000"/>
-                </a:schemeClr>
-              </a:solidFill>
-            </a:ln>
-          </p:spPr>
-          <p:style>
-            <a:lnRef idx="2">
-              <a:schemeClr val="accent1">
-                <a:shade val="50000"/>
-              </a:schemeClr>
-            </a:lnRef>
-            <a:fillRef idx="1">
-              <a:schemeClr val="accent1"/>
-            </a:fillRef>
-            <a:effectRef idx="0">
-              <a:schemeClr val="accent1"/>
-            </a:effectRef>
-            <a:fontRef idx="minor">
-              <a:schemeClr val="lt1"/>
-            </a:fontRef>
-          </p:style>
-          <p:txBody>
-            <a:bodyPr rtlCol="0" anchor="ctr"/>
-            <a:lstStyle/>
-            <a:p>
-              <a:pPr algn="ctr"/>
-              <a:endParaRPr lang="en-US"/>
-            </a:p>
-          </p:txBody>
-        </p:sp>
-        <p:sp>
-          <p:nvSpPr>
-            <p:cNvPr id="374" name="Freeform 373">
-              <a:extLst>
-                <a:ext uri="{FF2B5EF4-FFF2-40B4-BE49-F238E27FC236}">
-                  <a16:creationId xmlns:a16="http://schemas.microsoft.com/office/drawing/2014/main" id="{8AE37AAF-5291-4349-AB50-A650DE34FF56}"/>
-                </a:ext>
-              </a:extLst>
-            </p:cNvPr>
-            <p:cNvSpPr/>
-            <p:nvPr/>
-          </p:nvSpPr>
-          <p:spPr>
-            <a:xfrm>
-              <a:off x="4811008" y="3502750"/>
-              <a:ext cx="537970" cy="416055"/>
-            </a:xfrm>
-            <a:custGeom>
-              <a:avLst/>
-              <a:gdLst>
-                <a:gd name="connsiteX0" fmla="*/ 0 w 1875692"/>
-                <a:gd name="connsiteY0" fmla="*/ 937383 h 1072198"/>
-                <a:gd name="connsiteX1" fmla="*/ 181708 w 1875692"/>
-                <a:gd name="connsiteY1" fmla="*/ 1001860 h 1072198"/>
-                <a:gd name="connsiteX2" fmla="*/ 410308 w 1875692"/>
-                <a:gd name="connsiteY2" fmla="*/ 913937 h 1072198"/>
-                <a:gd name="connsiteX3" fmla="*/ 586154 w 1875692"/>
-                <a:gd name="connsiteY3" fmla="*/ 972552 h 1072198"/>
-                <a:gd name="connsiteX4" fmla="*/ 756139 w 1875692"/>
-                <a:gd name="connsiteY4" fmla="*/ 790844 h 1072198"/>
-                <a:gd name="connsiteX5" fmla="*/ 1084385 w 1875692"/>
-                <a:gd name="connsiteY5" fmla="*/ 5398 h 1072198"/>
-                <a:gd name="connsiteX6" fmla="*/ 1459523 w 1875692"/>
-                <a:gd name="connsiteY6" fmla="*/ 456737 h 1072198"/>
-                <a:gd name="connsiteX7" fmla="*/ 1693985 w 1875692"/>
-                <a:gd name="connsiteY7" fmla="*/ 702921 h 1072198"/>
-                <a:gd name="connsiteX8" fmla="*/ 1875692 w 1875692"/>
-                <a:gd name="connsiteY8" fmla="*/ 1072198 h 1072198"/>
-              </a:gdLst>
-              <a:ahLst/>
-              <a:cxnLst>
-                <a:cxn ang="0">
-                  <a:pos x="connsiteX0" y="connsiteY0"/>
-                </a:cxn>
-                <a:cxn ang="0">
-                  <a:pos x="connsiteX1" y="connsiteY1"/>
-                </a:cxn>
-                <a:cxn ang="0">
-                  <a:pos x="connsiteX2" y="connsiteY2"/>
-                </a:cxn>
-                <a:cxn ang="0">
-                  <a:pos x="connsiteX3" y="connsiteY3"/>
-                </a:cxn>
-                <a:cxn ang="0">
-                  <a:pos x="connsiteX4" y="connsiteY4"/>
-                </a:cxn>
-                <a:cxn ang="0">
-                  <a:pos x="connsiteX5" y="connsiteY5"/>
-                </a:cxn>
-                <a:cxn ang="0">
-                  <a:pos x="connsiteX6" y="connsiteY6"/>
-                </a:cxn>
-                <a:cxn ang="0">
-                  <a:pos x="connsiteX7" y="connsiteY7"/>
-                </a:cxn>
-                <a:cxn ang="0">
-                  <a:pos x="connsiteX8" y="connsiteY8"/>
-                </a:cxn>
-              </a:cxnLst>
-              <a:rect l="l" t="t" r="r" b="b"/>
-              <a:pathLst>
-                <a:path w="1875692" h="1072198">
-                  <a:moveTo>
-                    <a:pt x="0" y="937383"/>
-                  </a:moveTo>
-                  <a:cubicBezTo>
-                    <a:pt x="56661" y="971575"/>
-                    <a:pt x="113323" y="1005768"/>
-                    <a:pt x="181708" y="1001860"/>
-                  </a:cubicBezTo>
-                  <a:cubicBezTo>
-                    <a:pt x="250093" y="997952"/>
-                    <a:pt x="342900" y="918822"/>
-                    <a:pt x="410308" y="913937"/>
-                  </a:cubicBezTo>
-                  <a:cubicBezTo>
-                    <a:pt x="477716" y="909052"/>
-                    <a:pt x="528516" y="993067"/>
-                    <a:pt x="586154" y="972552"/>
-                  </a:cubicBezTo>
-                  <a:cubicBezTo>
-                    <a:pt x="643792" y="952037"/>
-                    <a:pt x="673101" y="952036"/>
-                    <a:pt x="756139" y="790844"/>
-                  </a:cubicBezTo>
-                  <a:cubicBezTo>
-                    <a:pt x="839178" y="629652"/>
-                    <a:pt x="967154" y="61082"/>
-                    <a:pt x="1084385" y="5398"/>
-                  </a:cubicBezTo>
-                  <a:cubicBezTo>
-                    <a:pt x="1201616" y="-50287"/>
-                    <a:pt x="1357923" y="340483"/>
-                    <a:pt x="1459523" y="456737"/>
-                  </a:cubicBezTo>
-                  <a:cubicBezTo>
-                    <a:pt x="1561123" y="572991"/>
-                    <a:pt x="1624624" y="600344"/>
-                    <a:pt x="1693985" y="702921"/>
-                  </a:cubicBezTo>
-                  <a:cubicBezTo>
-                    <a:pt x="1763346" y="805498"/>
-                    <a:pt x="1819519" y="938848"/>
-                    <a:pt x="1875692" y="1072198"/>
-                  </a:cubicBezTo>
-                </a:path>
-              </a:pathLst>
-            </a:custGeom>
-            <a:noFill/>
-            <a:ln>
-              <a:solidFill>
-                <a:schemeClr val="tx1">
-                  <a:lumMod val="65000"/>
-                  <a:lumOff val="35000"/>
-                </a:schemeClr>
-              </a:solidFill>
-            </a:ln>
-          </p:spPr>
-          <p:style>
-            <a:lnRef idx="2">
-              <a:schemeClr val="accent1">
-                <a:shade val="50000"/>
-              </a:schemeClr>
-            </a:lnRef>
-            <a:fillRef idx="1">
-              <a:schemeClr val="accent1"/>
-            </a:fillRef>
-            <a:effectRef idx="0">
-              <a:schemeClr val="accent1"/>
-            </a:effectRef>
-            <a:fontRef idx="minor">
-              <a:schemeClr val="lt1"/>
-            </a:fontRef>
-          </p:style>
-          <p:txBody>
-            <a:bodyPr rtlCol="0" anchor="ctr"/>
-            <a:lstStyle/>
-            <a:p>
-              <a:pPr algn="ctr"/>
-              <a:endParaRPr lang="en-US"/>
-            </a:p>
-          </p:txBody>
-        </p:sp>
-        <p:sp>
-          <p:nvSpPr>
-            <p:cNvPr id="377" name="Oval 376">
-              <a:extLst>
-                <a:ext uri="{FF2B5EF4-FFF2-40B4-BE49-F238E27FC236}">
-                  <a16:creationId xmlns:a16="http://schemas.microsoft.com/office/drawing/2014/main" id="{F95FB878-7A01-1541-8D00-3E7F93A46D68}"/>
-                </a:ext>
-              </a:extLst>
-            </p:cNvPr>
-            <p:cNvSpPr>
-              <a:spLocks noChangeAspect="1"/>
-            </p:cNvSpPr>
-            <p:nvPr/>
-          </p:nvSpPr>
-          <p:spPr>
-            <a:xfrm>
-              <a:off x="4308034" y="3835639"/>
-              <a:ext cx="27432" cy="27432"/>
-            </a:xfrm>
-            <a:prstGeom prst="ellipse">
-              <a:avLst/>
-            </a:prstGeom>
-            <a:solidFill>
-              <a:srgbClr val="2F61FF"/>
-            </a:solidFill>
-            <a:ln>
-              <a:solidFill>
-                <a:srgbClr val="434DF3"/>
-              </a:solidFill>
-            </a:ln>
-          </p:spPr>
-          <p:style>
-            <a:lnRef idx="2">
-              <a:schemeClr val="dk1">
-                <a:shade val="50000"/>
-              </a:schemeClr>
-            </a:lnRef>
-            <a:fillRef idx="1">
-              <a:schemeClr val="dk1"/>
-            </a:fillRef>
-            <a:effectRef idx="0">
-              <a:schemeClr val="dk1"/>
-            </a:effectRef>
-            <a:fontRef idx="minor">
-              <a:schemeClr val="lt1"/>
-            </a:fontRef>
-          </p:style>
-          <p:txBody>
-            <a:bodyPr rtlCol="0" anchor="ctr"/>
-            <a:lstStyle/>
-            <a:p>
-              <a:pPr algn="ctr"/>
-              <a:endParaRPr lang="en-US"/>
-            </a:p>
-          </p:txBody>
-        </p:sp>
-        <p:sp>
-          <p:nvSpPr>
-            <p:cNvPr id="378" name="Oval 377">
-              <a:extLst>
-                <a:ext uri="{FF2B5EF4-FFF2-40B4-BE49-F238E27FC236}">
-                  <a16:creationId xmlns:a16="http://schemas.microsoft.com/office/drawing/2014/main" id="{82A0D134-291B-6643-817D-2B057EB32B9F}"/>
-                </a:ext>
-              </a:extLst>
-            </p:cNvPr>
-            <p:cNvSpPr>
-              <a:spLocks noChangeAspect="1"/>
-            </p:cNvSpPr>
-            <p:nvPr/>
-          </p:nvSpPr>
-          <p:spPr>
-            <a:xfrm>
-              <a:off x="4581155" y="3596323"/>
-              <a:ext cx="27432" cy="27432"/>
-            </a:xfrm>
-            <a:prstGeom prst="ellipse">
-              <a:avLst/>
-            </a:prstGeom>
-            <a:solidFill>
-              <a:srgbClr val="FF120F"/>
-            </a:solidFill>
-            <a:ln>
-              <a:solidFill>
-                <a:srgbClr val="FF120F"/>
-              </a:solidFill>
-            </a:ln>
-          </p:spPr>
-          <p:style>
-            <a:lnRef idx="2">
-              <a:schemeClr val="dk1">
-                <a:shade val="50000"/>
-              </a:schemeClr>
-            </a:lnRef>
-            <a:fillRef idx="1">
-              <a:schemeClr val="dk1"/>
-            </a:fillRef>
-            <a:effectRef idx="0">
-              <a:schemeClr val="dk1"/>
-            </a:effectRef>
-            <a:fontRef idx="minor">
-              <a:schemeClr val="lt1"/>
-            </a:fontRef>
-          </p:style>
-          <p:txBody>
-            <a:bodyPr rtlCol="0" anchor="ctr"/>
-            <a:lstStyle/>
-            <a:p>
-              <a:pPr algn="ctr"/>
-              <a:endParaRPr lang="en-US"/>
-            </a:p>
-          </p:txBody>
-        </p:sp>
-        <p:sp>
-          <p:nvSpPr>
-            <p:cNvPr id="379" name="Oval 378">
-              <a:extLst>
-                <a:ext uri="{FF2B5EF4-FFF2-40B4-BE49-F238E27FC236}">
-                  <a16:creationId xmlns:a16="http://schemas.microsoft.com/office/drawing/2014/main" id="{412B80F1-22D5-4F46-88CD-10CC98B8157F}"/>
-                </a:ext>
-              </a:extLst>
-            </p:cNvPr>
-            <p:cNvSpPr>
-              <a:spLocks noChangeAspect="1"/>
-            </p:cNvSpPr>
-            <p:nvPr/>
-          </p:nvSpPr>
-          <p:spPr>
-            <a:xfrm>
-              <a:off x="4845265" y="3882119"/>
-              <a:ext cx="27432" cy="27432"/>
-            </a:xfrm>
-            <a:prstGeom prst="ellipse">
-              <a:avLst/>
-            </a:prstGeom>
-            <a:solidFill>
-              <a:srgbClr val="2F61FF"/>
-            </a:solidFill>
-            <a:ln>
-              <a:solidFill>
-                <a:srgbClr val="434DF3"/>
-              </a:solidFill>
-            </a:ln>
-          </p:spPr>
-          <p:style>
-            <a:lnRef idx="2">
-              <a:schemeClr val="dk1">
-                <a:shade val="50000"/>
-              </a:schemeClr>
-            </a:lnRef>
-            <a:fillRef idx="1">
-              <a:schemeClr val="dk1"/>
-            </a:fillRef>
-            <a:effectRef idx="0">
-              <a:schemeClr val="dk1"/>
-            </a:effectRef>
-            <a:fontRef idx="minor">
-              <a:schemeClr val="lt1"/>
-            </a:fontRef>
-          </p:style>
-          <p:txBody>
-            <a:bodyPr rtlCol="0" anchor="ctr"/>
-            <a:lstStyle/>
-            <a:p>
-              <a:pPr algn="ctr"/>
-              <a:endParaRPr lang="en-US"/>
-            </a:p>
-          </p:txBody>
-        </p:sp>
-        <p:sp>
-          <p:nvSpPr>
-            <p:cNvPr id="380" name="Oval 379">
-              <a:extLst>
-                <a:ext uri="{FF2B5EF4-FFF2-40B4-BE49-F238E27FC236}">
-                  <a16:creationId xmlns:a16="http://schemas.microsoft.com/office/drawing/2014/main" id="{78177981-8A98-CB44-8F09-4400351A112B}"/>
-                </a:ext>
-              </a:extLst>
-            </p:cNvPr>
-            <p:cNvSpPr>
-              <a:spLocks noChangeAspect="1"/>
-            </p:cNvSpPr>
-            <p:nvPr/>
-          </p:nvSpPr>
-          <p:spPr>
-            <a:xfrm>
-              <a:off x="5116493" y="3487376"/>
-              <a:ext cx="27432" cy="27432"/>
-            </a:xfrm>
-            <a:prstGeom prst="ellipse">
-              <a:avLst/>
-            </a:prstGeom>
-            <a:solidFill>
-              <a:srgbClr val="FF120F"/>
-            </a:solidFill>
-            <a:ln>
-              <a:solidFill>
-                <a:srgbClr val="FF120F"/>
-              </a:solidFill>
-            </a:ln>
-          </p:spPr>
-          <p:style>
-            <a:lnRef idx="2">
-              <a:schemeClr val="dk1">
-                <a:shade val="50000"/>
-              </a:schemeClr>
-            </a:lnRef>
-            <a:fillRef idx="1">
-              <a:schemeClr val="dk1"/>
-            </a:fillRef>
-            <a:effectRef idx="0">
-              <a:schemeClr val="dk1"/>
-            </a:effectRef>
-            <a:fontRef idx="minor">
-              <a:schemeClr val="lt1"/>
-            </a:fontRef>
-          </p:style>
-          <p:txBody>
-            <a:bodyPr rtlCol="0" anchor="ctr"/>
-            <a:lstStyle/>
-            <a:p>
-              <a:pPr algn="ctr"/>
-              <a:endParaRPr lang="en-US"/>
-            </a:p>
-          </p:txBody>
-        </p:sp>
-        <p:cxnSp>
-          <p:nvCxnSpPr>
-            <p:cNvPr id="388" name="Straight Connector 387">
-              <a:extLst>
-                <a:ext uri="{FF2B5EF4-FFF2-40B4-BE49-F238E27FC236}">
-                  <a16:creationId xmlns:a16="http://schemas.microsoft.com/office/drawing/2014/main" id="{3C823550-F996-AD49-A42F-2E66278C3153}"/>
-                </a:ext>
-              </a:extLst>
-            </p:cNvPr>
-            <p:cNvCxnSpPr>
-              <a:cxnSpLocks/>
-            </p:cNvCxnSpPr>
-            <p:nvPr/>
-          </p:nvCxnSpPr>
-          <p:spPr>
-            <a:xfrm>
-              <a:off x="4592192" y="3610747"/>
-              <a:ext cx="0" cy="237744"/>
-            </a:xfrm>
-            <a:prstGeom prst="line">
-              <a:avLst/>
-            </a:prstGeom>
-            <a:ln w="12700"/>
-          </p:spPr>
-          <p:style>
-            <a:lnRef idx="1">
-              <a:schemeClr val="dk1"/>
-            </a:lnRef>
-            <a:fillRef idx="0">
-              <a:schemeClr val="dk1"/>
-            </a:fillRef>
-            <a:effectRef idx="0">
-              <a:schemeClr val="dk1"/>
-            </a:effectRef>
-            <a:fontRef idx="minor">
-              <a:schemeClr val="tx1"/>
-            </a:fontRef>
-          </p:style>
-        </p:cxnSp>
-        <p:cxnSp>
-          <p:nvCxnSpPr>
-            <p:cNvPr id="389" name="Straight Connector 388">
-              <a:extLst>
-                <a:ext uri="{FF2B5EF4-FFF2-40B4-BE49-F238E27FC236}">
-                  <a16:creationId xmlns:a16="http://schemas.microsoft.com/office/drawing/2014/main" id="{81DF0B5B-EEE0-DE43-8C97-394E9904431A}"/>
-                </a:ext>
-              </a:extLst>
-            </p:cNvPr>
-            <p:cNvCxnSpPr>
-              <a:cxnSpLocks/>
-            </p:cNvCxnSpPr>
-            <p:nvPr/>
-          </p:nvCxnSpPr>
-          <p:spPr>
-            <a:xfrm flipH="1">
-              <a:off x="4561302" y="3846437"/>
-              <a:ext cx="70374" cy="0"/>
-            </a:xfrm>
-            <a:prstGeom prst="line">
-              <a:avLst/>
-            </a:prstGeom>
-            <a:ln w="12700"/>
-          </p:spPr>
-          <p:style>
-            <a:lnRef idx="1">
-              <a:schemeClr val="dk1"/>
-            </a:lnRef>
-            <a:fillRef idx="0">
-              <a:schemeClr val="dk1"/>
-            </a:fillRef>
-            <a:effectRef idx="0">
-              <a:schemeClr val="dk1"/>
-            </a:effectRef>
-            <a:fontRef idx="minor">
-              <a:schemeClr val="tx1"/>
-            </a:fontRef>
-          </p:style>
-        </p:cxnSp>
-        <p:cxnSp>
-          <p:nvCxnSpPr>
-            <p:cNvPr id="390" name="Straight Connector 389">
-              <a:extLst>
-                <a:ext uri="{FF2B5EF4-FFF2-40B4-BE49-F238E27FC236}">
-                  <a16:creationId xmlns:a16="http://schemas.microsoft.com/office/drawing/2014/main" id="{4A508AAA-3A2B-3F45-BBE3-14A092A00B05}"/>
-                </a:ext>
-              </a:extLst>
-            </p:cNvPr>
-            <p:cNvCxnSpPr>
-              <a:cxnSpLocks/>
-            </p:cNvCxnSpPr>
-            <p:nvPr/>
-          </p:nvCxnSpPr>
-          <p:spPr>
-            <a:xfrm flipH="1">
-              <a:off x="4561302" y="3614041"/>
-              <a:ext cx="70374" cy="0"/>
-            </a:xfrm>
-            <a:prstGeom prst="line">
-              <a:avLst/>
-            </a:prstGeom>
-            <a:ln w="12700"/>
-          </p:spPr>
-          <p:style>
-            <a:lnRef idx="1">
-              <a:schemeClr val="dk1"/>
-            </a:lnRef>
-            <a:fillRef idx="0">
-              <a:schemeClr val="dk1"/>
-            </a:fillRef>
-            <a:effectRef idx="0">
-              <a:schemeClr val="dk1"/>
-            </a:effectRef>
-            <a:fontRef idx="minor">
-              <a:schemeClr val="tx1"/>
-            </a:fontRef>
-          </p:style>
-        </p:cxnSp>
-        <p:cxnSp>
-          <p:nvCxnSpPr>
-            <p:cNvPr id="391" name="Straight Connector 390">
-              <a:extLst>
-                <a:ext uri="{FF2B5EF4-FFF2-40B4-BE49-F238E27FC236}">
-                  <a16:creationId xmlns:a16="http://schemas.microsoft.com/office/drawing/2014/main" id="{60E321D7-C6B0-004D-A41A-939AC62EAFFD}"/>
-                </a:ext>
-              </a:extLst>
-            </p:cNvPr>
-            <p:cNvCxnSpPr>
-              <a:cxnSpLocks/>
-            </p:cNvCxnSpPr>
-            <p:nvPr/>
-          </p:nvCxnSpPr>
-          <p:spPr>
-            <a:xfrm>
-              <a:off x="5132374" y="3502433"/>
-              <a:ext cx="0" cy="390066"/>
-            </a:xfrm>
-            <a:prstGeom prst="line">
-              <a:avLst/>
-            </a:prstGeom>
-            <a:ln w="12700"/>
-          </p:spPr>
-          <p:style>
-            <a:lnRef idx="1">
-              <a:schemeClr val="dk1"/>
-            </a:lnRef>
-            <a:fillRef idx="0">
-              <a:schemeClr val="dk1"/>
-            </a:fillRef>
-            <a:effectRef idx="0">
-              <a:schemeClr val="dk1"/>
-            </a:effectRef>
-            <a:fontRef idx="minor">
-              <a:schemeClr val="tx1"/>
-            </a:fontRef>
-          </p:style>
-        </p:cxnSp>
-        <p:cxnSp>
-          <p:nvCxnSpPr>
-            <p:cNvPr id="392" name="Straight Connector 391">
-              <a:extLst>
-                <a:ext uri="{FF2B5EF4-FFF2-40B4-BE49-F238E27FC236}">
-                  <a16:creationId xmlns:a16="http://schemas.microsoft.com/office/drawing/2014/main" id="{31F3A672-58A6-B145-BE8E-97AE7CF6FE9E}"/>
-                </a:ext>
-              </a:extLst>
-            </p:cNvPr>
-            <p:cNvCxnSpPr>
-              <a:cxnSpLocks/>
-            </p:cNvCxnSpPr>
-            <p:nvPr/>
-          </p:nvCxnSpPr>
-          <p:spPr>
-            <a:xfrm flipH="1">
-              <a:off x="5101484" y="3896682"/>
-              <a:ext cx="70374" cy="0"/>
-            </a:xfrm>
-            <a:prstGeom prst="line">
-              <a:avLst/>
-            </a:prstGeom>
-            <a:ln w="12700"/>
-          </p:spPr>
-          <p:style>
-            <a:lnRef idx="1">
-              <a:schemeClr val="dk1"/>
-            </a:lnRef>
-            <a:fillRef idx="0">
-              <a:schemeClr val="dk1"/>
-            </a:fillRef>
-            <a:effectRef idx="0">
-              <a:schemeClr val="dk1"/>
-            </a:effectRef>
-            <a:fontRef idx="minor">
-              <a:schemeClr val="tx1"/>
-            </a:fontRef>
-          </p:style>
-        </p:cxnSp>
-        <p:cxnSp>
-          <p:nvCxnSpPr>
-            <p:cNvPr id="393" name="Straight Connector 392">
-              <a:extLst>
-                <a:ext uri="{FF2B5EF4-FFF2-40B4-BE49-F238E27FC236}">
-                  <a16:creationId xmlns:a16="http://schemas.microsoft.com/office/drawing/2014/main" id="{31155058-FE33-DB46-B62F-45440FBCFC7C}"/>
-                </a:ext>
-              </a:extLst>
-            </p:cNvPr>
-            <p:cNvCxnSpPr>
-              <a:cxnSpLocks/>
-            </p:cNvCxnSpPr>
-            <p:nvPr/>
-          </p:nvCxnSpPr>
-          <p:spPr>
-            <a:xfrm flipH="1">
-              <a:off x="5101484" y="3505727"/>
-              <a:ext cx="70374" cy="0"/>
-            </a:xfrm>
-            <a:prstGeom prst="line">
-              <a:avLst/>
-            </a:prstGeom>
-            <a:ln w="12700"/>
-          </p:spPr>
-          <p:style>
-            <a:lnRef idx="1">
-              <a:schemeClr val="dk1"/>
-            </a:lnRef>
-            <a:fillRef idx="0">
-              <a:schemeClr val="dk1"/>
-            </a:fillRef>
-            <a:effectRef idx="0">
-              <a:schemeClr val="dk1"/>
-            </a:effectRef>
-            <a:fontRef idx="minor">
-              <a:schemeClr val="tx1"/>
-            </a:fontRef>
-          </p:style>
-        </p:cxnSp>
-        <p:cxnSp>
-          <p:nvCxnSpPr>
-            <p:cNvPr id="400" name="Straight Connector 399">
-              <a:extLst>
-                <a:ext uri="{FF2B5EF4-FFF2-40B4-BE49-F238E27FC236}">
-                  <a16:creationId xmlns:a16="http://schemas.microsoft.com/office/drawing/2014/main" id="{C842B8FE-7F6B-CF4A-9F0F-C32E1AB691FF}"/>
-                </a:ext>
-              </a:extLst>
-            </p:cNvPr>
-            <p:cNvCxnSpPr>
-              <a:cxnSpLocks/>
-              <a:endCxn id="377" idx="6"/>
-            </p:cNvCxnSpPr>
-            <p:nvPr/>
-          </p:nvCxnSpPr>
-          <p:spPr>
-            <a:xfrm flipH="1">
-              <a:off x="4335466" y="3849355"/>
-              <a:ext cx="245690" cy="0"/>
-            </a:xfrm>
-            <a:prstGeom prst="line">
-              <a:avLst/>
-            </a:prstGeom>
-            <a:ln w="9525">
-              <a:prstDash val="sysDash"/>
-            </a:ln>
-          </p:spPr>
-          <p:style>
-            <a:lnRef idx="1">
-              <a:schemeClr val="dk1"/>
-            </a:lnRef>
-            <a:fillRef idx="0">
-              <a:schemeClr val="dk1"/>
-            </a:fillRef>
-            <a:effectRef idx="0">
-              <a:schemeClr val="dk1"/>
-            </a:effectRef>
-            <a:fontRef idx="minor">
-              <a:schemeClr val="tx1"/>
-            </a:fontRef>
-          </p:style>
-        </p:cxnSp>
-        <p:cxnSp>
-          <p:nvCxnSpPr>
-            <p:cNvPr id="401" name="Straight Connector 400">
-              <a:extLst>
-                <a:ext uri="{FF2B5EF4-FFF2-40B4-BE49-F238E27FC236}">
-                  <a16:creationId xmlns:a16="http://schemas.microsoft.com/office/drawing/2014/main" id="{D3CD97A3-0D8F-9948-948A-953C203A6921}"/>
-                </a:ext>
-              </a:extLst>
-            </p:cNvPr>
-            <p:cNvCxnSpPr>
-              <a:cxnSpLocks/>
-            </p:cNvCxnSpPr>
-            <p:nvPr/>
-          </p:nvCxnSpPr>
-          <p:spPr>
-            <a:xfrm flipH="1">
-              <a:off x="4855794" y="3893494"/>
-              <a:ext cx="276580" cy="0"/>
-            </a:xfrm>
-            <a:prstGeom prst="line">
-              <a:avLst/>
-            </a:prstGeom>
-            <a:ln w="9525">
-              <a:prstDash val="sysDash"/>
-            </a:ln>
-          </p:spPr>
-          <p:style>
-            <a:lnRef idx="1">
-              <a:schemeClr val="dk1"/>
-            </a:lnRef>
-            <a:fillRef idx="0">
-              <a:schemeClr val="dk1"/>
-            </a:fillRef>
-            <a:effectRef idx="0">
-              <a:schemeClr val="dk1"/>
-            </a:effectRef>
-            <a:fontRef idx="minor">
-              <a:schemeClr val="tx1"/>
-            </a:fontRef>
-          </p:style>
-        </p:cxnSp>
-      </p:grpSp>
       <p:sp>
         <p:nvSpPr>
           <p:cNvPr id="408" name="TextBox 407">
@@ -42004,7 +41100,7 @@
         </p:nvSpPr>
         <p:spPr>
           <a:xfrm>
-            <a:off x="5283001" y="3055473"/>
+            <a:off x="5283001" y="3081600"/>
             <a:ext cx="1202988" cy="415498"/>
           </a:xfrm>
           <a:prstGeom prst="rect">
@@ -42069,7 +41165,7 @@
         </p:nvSpPr>
         <p:spPr>
           <a:xfrm>
-            <a:off x="5076456" y="4398840"/>
+            <a:off x="4781324" y="4381422"/>
             <a:ext cx="978694" cy="187615"/>
           </a:xfrm>
           <a:prstGeom prst="rect">
@@ -42083,48 +41179,12 @@
           </a:bodyPr>
           <a:lstStyle/>
           <a:p>
+            <a:pPr algn="ctr"/>
             <a:r>
               <a:rPr lang="en-US" sz="619" dirty="0">
                 <a:latin typeface="Helvetica" pitchFamily="2" charset="0"/>
               </a:rPr>
-              <a:t>Year</a:t>
-            </a:r>
-          </a:p>
-        </p:txBody>
-      </p:sp>
-      <p:sp>
-        <p:nvSpPr>
-          <p:cNvPr id="411" name="TextBox 410">
-            <a:extLst>
-              <a:ext uri="{FF2B5EF4-FFF2-40B4-BE49-F238E27FC236}">
-                <a16:creationId xmlns:a16="http://schemas.microsoft.com/office/drawing/2014/main" id="{D36D4307-5188-584D-9184-ADD74D02E143}"/>
-              </a:ext>
-            </a:extLst>
-          </p:cNvPr>
-          <p:cNvSpPr txBox="1"/>
-          <p:nvPr/>
-        </p:nvSpPr>
-        <p:spPr>
-          <a:xfrm>
-            <a:off x="6084644" y="4270964"/>
-            <a:ext cx="222225" cy="187615"/>
-          </a:xfrm>
-          <a:prstGeom prst="rect">
-            <a:avLst/>
-          </a:prstGeom>
-          <a:noFill/>
-        </p:spPr>
-        <p:txBody>
-          <a:bodyPr wrap="square" rtlCol="0">
-            <a:spAutoFit/>
-          </a:bodyPr>
-          <a:lstStyle/>
-          <a:p>
-            <a:r>
-              <a:rPr lang="en-US" sz="619" dirty="0">
-                <a:latin typeface="Helvetica" pitchFamily="2" charset="0"/>
-              </a:rPr>
-              <a:t>2</a:t>
+              <a:t>Seasonality</a:t>
             </a:r>
           </a:p>
         </p:txBody>
@@ -43566,8 +42626,8 @@
         </p:nvGrpSpPr>
         <p:grpSpPr>
           <a:xfrm>
-            <a:off x="4148959" y="1629506"/>
-            <a:ext cx="2135981" cy="1291509"/>
+            <a:off x="4148959" y="1628664"/>
+            <a:ext cx="2135981" cy="1153007"/>
             <a:chOff x="1754567" y="2653126"/>
             <a:chExt cx="2135981" cy="2135982"/>
           </a:xfrm>
@@ -43663,7 +42723,7 @@
         </p:nvSpPr>
         <p:spPr>
           <a:xfrm>
-            <a:off x="4603027" y="2901328"/>
+            <a:off x="4603027" y="2883910"/>
             <a:ext cx="1335289" cy="187615"/>
           </a:xfrm>
           <a:prstGeom prst="rect">
@@ -43677,11 +42737,12 @@
           </a:bodyPr>
           <a:lstStyle/>
           <a:p>
+            <a:pPr algn="ctr"/>
             <a:r>
               <a:rPr lang="en-US" sz="619" dirty="0">
                 <a:latin typeface="Helvetica" pitchFamily="2" charset="0"/>
               </a:rPr>
-              <a:t>Environmental Temperature</a:t>
+              <a:t>Raw Temperature</a:t>
             </a:r>
           </a:p>
         </p:txBody>
@@ -43737,7 +42798,7 @@
         </p:nvSpPr>
         <p:spPr>
           <a:xfrm rot="16200000" flipH="1" flipV="1">
-            <a:off x="3488487" y="28665"/>
+            <a:off x="3488487" y="-6171"/>
             <a:ext cx="1691455" cy="3799836"/>
           </a:xfrm>
           <a:prstGeom prst="arc">
@@ -43792,7 +42853,7 @@
         </p:nvSpPr>
         <p:spPr>
           <a:xfrm>
-            <a:off x="4170300" y="2310543"/>
+            <a:off x="4170300" y="2293125"/>
             <a:ext cx="1202988" cy="415498"/>
           </a:xfrm>
           <a:prstGeom prst="rect">
@@ -46895,6 +45956,311 @@
           <a:p>
             <a:pPr algn="ctr"/>
             <a:endParaRPr lang="en-US"/>
+          </a:p>
+        </p:txBody>
+      </p:sp>
+      <p:cxnSp>
+        <p:nvCxnSpPr>
+          <p:cNvPr id="10" name="Straight Connector 9">
+            <a:extLst>
+              <a:ext uri="{FF2B5EF4-FFF2-40B4-BE49-F238E27FC236}">
+                <a16:creationId xmlns:a16="http://schemas.microsoft.com/office/drawing/2014/main" id="{A5405676-A06A-EA44-8986-0F4C94349429}"/>
+              </a:ext>
+            </a:extLst>
+          </p:cNvPr>
+          <p:cNvCxnSpPr>
+            <a:cxnSpLocks/>
+          </p:cNvCxnSpPr>
+          <p:nvPr/>
+        </p:nvCxnSpPr>
+        <p:spPr>
+          <a:xfrm>
+            <a:off x="4437432" y="3661068"/>
+            <a:ext cx="1400153" cy="487411"/>
+          </a:xfrm>
+          <a:prstGeom prst="line">
+            <a:avLst/>
+          </a:prstGeom>
+          <a:ln w="12700">
+            <a:solidFill>
+              <a:srgbClr val="595959"/>
+            </a:solidFill>
+          </a:ln>
+        </p:spPr>
+        <p:style>
+          <a:lnRef idx="1">
+            <a:schemeClr val="accent1"/>
+          </a:lnRef>
+          <a:fillRef idx="0">
+            <a:schemeClr val="accent1"/>
+          </a:fillRef>
+          <a:effectRef idx="0">
+            <a:schemeClr val="accent1"/>
+          </a:effectRef>
+          <a:fontRef idx="minor">
+            <a:schemeClr val="tx1"/>
+          </a:fontRef>
+        </p:style>
+      </p:cxnSp>
+      <p:cxnSp>
+        <p:nvCxnSpPr>
+          <p:cNvPr id="199" name="Straight Connector 198">
+            <a:extLst>
+              <a:ext uri="{FF2B5EF4-FFF2-40B4-BE49-F238E27FC236}">
+                <a16:creationId xmlns:a16="http://schemas.microsoft.com/office/drawing/2014/main" id="{A2CDB4C7-678E-0B42-ACED-23972E076C6F}"/>
+              </a:ext>
+            </a:extLst>
+          </p:cNvPr>
+          <p:cNvCxnSpPr>
+            <a:cxnSpLocks/>
+          </p:cNvCxnSpPr>
+          <p:nvPr/>
+        </p:nvCxnSpPr>
+        <p:spPr>
+          <a:xfrm flipV="1">
+            <a:off x="4463136" y="3660840"/>
+            <a:ext cx="1308467" cy="429462"/>
+          </a:xfrm>
+          <a:prstGeom prst="line">
+            <a:avLst/>
+          </a:prstGeom>
+          <a:ln w="12700">
+            <a:solidFill>
+              <a:srgbClr val="595959"/>
+            </a:solidFill>
+            <a:prstDash val="sysDash"/>
+          </a:ln>
+        </p:spPr>
+        <p:style>
+          <a:lnRef idx="1">
+            <a:schemeClr val="accent1"/>
+          </a:lnRef>
+          <a:fillRef idx="0">
+            <a:schemeClr val="accent1"/>
+          </a:fillRef>
+          <a:effectRef idx="0">
+            <a:schemeClr val="accent1"/>
+          </a:effectRef>
+          <a:fontRef idx="minor">
+            <a:schemeClr val="tx1"/>
+          </a:fontRef>
+        </p:style>
+      </p:cxnSp>
+      <p:sp>
+        <p:nvSpPr>
+          <p:cNvPr id="16" name="TextBox 15">
+            <a:extLst>
+              <a:ext uri="{FF2B5EF4-FFF2-40B4-BE49-F238E27FC236}">
+                <a16:creationId xmlns:a16="http://schemas.microsoft.com/office/drawing/2014/main" id="{95582B21-C07A-844F-8F49-B6C6118364E4}"/>
+              </a:ext>
+            </a:extLst>
+          </p:cNvPr>
+          <p:cNvSpPr txBox="1"/>
+          <p:nvPr/>
+        </p:nvSpPr>
+        <p:spPr>
+          <a:xfrm>
+            <a:off x="5737883" y="3528741"/>
+            <a:ext cx="698368" cy="200055"/>
+          </a:xfrm>
+          <a:prstGeom prst="rect">
+            <a:avLst/>
+          </a:prstGeom>
+          <a:noFill/>
+        </p:spPr>
+        <p:txBody>
+          <a:bodyPr wrap="square" rtlCol="0">
+            <a:spAutoFit/>
+          </a:bodyPr>
+          <a:lstStyle/>
+          <a:p>
+            <a:r>
+              <a:rPr lang="en-US" sz="700" dirty="0"/>
+              <a:t>Departures</a:t>
+            </a:r>
+          </a:p>
+        </p:txBody>
+      </p:sp>
+      <p:sp>
+        <p:nvSpPr>
+          <p:cNvPr id="200" name="TextBox 199">
+            <a:extLst>
+              <a:ext uri="{FF2B5EF4-FFF2-40B4-BE49-F238E27FC236}">
+                <a16:creationId xmlns:a16="http://schemas.microsoft.com/office/drawing/2014/main" id="{0593C540-BB70-B34A-AE44-28B5D9C14595}"/>
+              </a:ext>
+            </a:extLst>
+          </p:cNvPr>
+          <p:cNvSpPr txBox="1"/>
+          <p:nvPr/>
+        </p:nvSpPr>
+        <p:spPr>
+          <a:xfrm>
+            <a:off x="5804513" y="4022847"/>
+            <a:ext cx="698368" cy="200055"/>
+          </a:xfrm>
+          <a:prstGeom prst="rect">
+            <a:avLst/>
+          </a:prstGeom>
+          <a:noFill/>
+        </p:spPr>
+        <p:txBody>
+          <a:bodyPr wrap="square" rtlCol="0">
+            <a:spAutoFit/>
+          </a:bodyPr>
+          <a:lstStyle/>
+          <a:p>
+            <a:r>
+              <a:rPr lang="en-US" sz="700" dirty="0"/>
+              <a:t>Arrivals</a:t>
+            </a:r>
+          </a:p>
+        </p:txBody>
+      </p:sp>
+      <p:sp>
+        <p:nvSpPr>
+          <p:cNvPr id="203" name="TextBox 202">
+            <a:extLst>
+              <a:ext uri="{FF2B5EF4-FFF2-40B4-BE49-F238E27FC236}">
+                <a16:creationId xmlns:a16="http://schemas.microsoft.com/office/drawing/2014/main" id="{51B0ED15-01FD-7E45-8427-166F3AA93C35}"/>
+              </a:ext>
+            </a:extLst>
+          </p:cNvPr>
+          <p:cNvSpPr txBox="1"/>
+          <p:nvPr/>
+        </p:nvSpPr>
+        <p:spPr>
+          <a:xfrm>
+            <a:off x="4428889" y="2779086"/>
+            <a:ext cx="417590" cy="187615"/>
+          </a:xfrm>
+          <a:prstGeom prst="rect">
+            <a:avLst/>
+          </a:prstGeom>
+          <a:noFill/>
+        </p:spPr>
+        <p:txBody>
+          <a:bodyPr wrap="square" rtlCol="0">
+            <a:spAutoFit/>
+          </a:bodyPr>
+          <a:lstStyle/>
+          <a:p>
+            <a:r>
+              <a:rPr lang="en-US" sz="619" dirty="0">
+                <a:latin typeface="Helvetica" pitchFamily="2" charset="0"/>
+              </a:rPr>
+              <a:t>Low</a:t>
+            </a:r>
+          </a:p>
+        </p:txBody>
+      </p:sp>
+      <p:sp>
+        <p:nvSpPr>
+          <p:cNvPr id="204" name="TextBox 203">
+            <a:extLst>
+              <a:ext uri="{FF2B5EF4-FFF2-40B4-BE49-F238E27FC236}">
+                <a16:creationId xmlns:a16="http://schemas.microsoft.com/office/drawing/2014/main" id="{8A178117-A221-4641-8E2C-749B43085410}"/>
+              </a:ext>
+            </a:extLst>
+          </p:cNvPr>
+          <p:cNvSpPr txBox="1"/>
+          <p:nvPr/>
+        </p:nvSpPr>
+        <p:spPr>
+          <a:xfrm>
+            <a:off x="5637328" y="2779086"/>
+            <a:ext cx="516369" cy="187615"/>
+          </a:xfrm>
+          <a:prstGeom prst="rect">
+            <a:avLst/>
+          </a:prstGeom>
+          <a:noFill/>
+        </p:spPr>
+        <p:txBody>
+          <a:bodyPr wrap="square" rtlCol="0">
+            <a:spAutoFit/>
+          </a:bodyPr>
+          <a:lstStyle/>
+          <a:p>
+            <a:r>
+              <a:rPr lang="en-US" sz="619" dirty="0">
+                <a:latin typeface="Helvetica" pitchFamily="2" charset="0"/>
+              </a:rPr>
+              <a:t>High</a:t>
+            </a:r>
+          </a:p>
+        </p:txBody>
+      </p:sp>
+      <p:sp>
+        <p:nvSpPr>
+          <p:cNvPr id="222" name="TextBox 221">
+            <a:extLst>
+              <a:ext uri="{FF2B5EF4-FFF2-40B4-BE49-F238E27FC236}">
+                <a16:creationId xmlns:a16="http://schemas.microsoft.com/office/drawing/2014/main" id="{B4CB1311-9FD9-F940-9EB5-7AE3F51A7665}"/>
+              </a:ext>
+            </a:extLst>
+          </p:cNvPr>
+          <p:cNvSpPr txBox="1"/>
+          <p:nvPr/>
+        </p:nvSpPr>
+        <p:spPr>
+          <a:xfrm>
+            <a:off x="4433128" y="4255005"/>
+            <a:ext cx="417590" cy="187615"/>
+          </a:xfrm>
+          <a:prstGeom prst="rect">
+            <a:avLst/>
+          </a:prstGeom>
+          <a:noFill/>
+        </p:spPr>
+        <p:txBody>
+          <a:bodyPr wrap="square" rtlCol="0">
+            <a:spAutoFit/>
+          </a:bodyPr>
+          <a:lstStyle/>
+          <a:p>
+            <a:r>
+              <a:rPr lang="en-US" sz="619" dirty="0">
+                <a:latin typeface="Helvetica" pitchFamily="2" charset="0"/>
+              </a:rPr>
+              <a:t>Low</a:t>
+            </a:r>
+          </a:p>
+        </p:txBody>
+      </p:sp>
+      <p:sp>
+        <p:nvSpPr>
+          <p:cNvPr id="223" name="TextBox 222">
+            <a:extLst>
+              <a:ext uri="{FF2B5EF4-FFF2-40B4-BE49-F238E27FC236}">
+                <a16:creationId xmlns:a16="http://schemas.microsoft.com/office/drawing/2014/main" id="{8C7CE772-6E49-2F40-8B75-63C0DB5EB84E}"/>
+              </a:ext>
+            </a:extLst>
+          </p:cNvPr>
+          <p:cNvSpPr txBox="1"/>
+          <p:nvPr/>
+        </p:nvSpPr>
+        <p:spPr>
+          <a:xfrm>
+            <a:off x="5641567" y="4255005"/>
+            <a:ext cx="516369" cy="187615"/>
+          </a:xfrm>
+          <a:prstGeom prst="rect">
+            <a:avLst/>
+          </a:prstGeom>
+          <a:noFill/>
+        </p:spPr>
+        <p:txBody>
+          <a:bodyPr wrap="square" rtlCol="0">
+            <a:spAutoFit/>
+          </a:bodyPr>
+          <a:lstStyle/>
+          <a:p>
+            <a:r>
+              <a:rPr lang="en-US" sz="619" dirty="0">
+                <a:latin typeface="Helvetica" pitchFamily="2" charset="0"/>
+              </a:rPr>
+              <a:t>High</a:t>
+            </a:r>
           </a:p>
         </p:txBody>
       </p:sp>

</xml_diff>